<commit_message>
updates to act 1
</commit_message>
<xml_diff>
--- a/images/images.pptx
+++ b/images/images.pptx
@@ -6,6 +6,7 @@
   </p:sldMasterIdLst>
   <p:sldIdLst>
     <p:sldId id="256" r:id="rId2"/>
+    <p:sldId id="257" r:id="rId3"/>
   </p:sldIdLst>
   <p:sldSz cx="9144000" cy="6858000" type="screen4x3"/>
   <p:notesSz cx="6858000" cy="9144000"/>
@@ -288,7 +289,7 @@
           <a:p>
             <a:fld id="{B9362D11-D6AC-6E40-8519-8C23875DBEAC}" type="datetimeFigureOut">
               <a:rPr lang="en-US" smtClean="0"/>
-              <a:t>6/29/14</a:t>
+              <a:t>7/7/14</a:t>
             </a:fld>
             <a:endParaRPr lang="en-US"/>
           </a:p>
@@ -458,7 +459,7 @@
           <a:p>
             <a:fld id="{B9362D11-D6AC-6E40-8519-8C23875DBEAC}" type="datetimeFigureOut">
               <a:rPr lang="en-US" smtClean="0"/>
-              <a:t>6/29/14</a:t>
+              <a:t>7/7/14</a:t>
             </a:fld>
             <a:endParaRPr lang="en-US"/>
           </a:p>
@@ -638,7 +639,7 @@
           <a:p>
             <a:fld id="{B9362D11-D6AC-6E40-8519-8C23875DBEAC}" type="datetimeFigureOut">
               <a:rPr lang="en-US" smtClean="0"/>
-              <a:t>6/29/14</a:t>
+              <a:t>7/7/14</a:t>
             </a:fld>
             <a:endParaRPr lang="en-US"/>
           </a:p>
@@ -808,7 +809,7 @@
           <a:p>
             <a:fld id="{B9362D11-D6AC-6E40-8519-8C23875DBEAC}" type="datetimeFigureOut">
               <a:rPr lang="en-US" smtClean="0"/>
-              <a:t>6/29/14</a:t>
+              <a:t>7/7/14</a:t>
             </a:fld>
             <a:endParaRPr lang="en-US"/>
           </a:p>
@@ -1054,7 +1055,7 @@
           <a:p>
             <a:fld id="{B9362D11-D6AC-6E40-8519-8C23875DBEAC}" type="datetimeFigureOut">
               <a:rPr lang="en-US" smtClean="0"/>
-              <a:t>6/29/14</a:t>
+              <a:t>7/7/14</a:t>
             </a:fld>
             <a:endParaRPr lang="en-US"/>
           </a:p>
@@ -1342,7 +1343,7 @@
           <a:p>
             <a:fld id="{B9362D11-D6AC-6E40-8519-8C23875DBEAC}" type="datetimeFigureOut">
               <a:rPr lang="en-US" smtClean="0"/>
-              <a:t>6/29/14</a:t>
+              <a:t>7/7/14</a:t>
             </a:fld>
             <a:endParaRPr lang="en-US"/>
           </a:p>
@@ -1764,7 +1765,7 @@
           <a:p>
             <a:fld id="{B9362D11-D6AC-6E40-8519-8C23875DBEAC}" type="datetimeFigureOut">
               <a:rPr lang="en-US" smtClean="0"/>
-              <a:t>6/29/14</a:t>
+              <a:t>7/7/14</a:t>
             </a:fld>
             <a:endParaRPr lang="en-US"/>
           </a:p>
@@ -1882,7 +1883,7 @@
           <a:p>
             <a:fld id="{B9362D11-D6AC-6E40-8519-8C23875DBEAC}" type="datetimeFigureOut">
               <a:rPr lang="en-US" smtClean="0"/>
-              <a:t>6/29/14</a:t>
+              <a:t>7/7/14</a:t>
             </a:fld>
             <a:endParaRPr lang="en-US"/>
           </a:p>
@@ -1977,7 +1978,7 @@
           <a:p>
             <a:fld id="{B9362D11-D6AC-6E40-8519-8C23875DBEAC}" type="datetimeFigureOut">
               <a:rPr lang="en-US" smtClean="0"/>
-              <a:t>6/29/14</a:t>
+              <a:t>7/7/14</a:t>
             </a:fld>
             <a:endParaRPr lang="en-US"/>
           </a:p>
@@ -2254,7 +2255,7 @@
           <a:p>
             <a:fld id="{B9362D11-D6AC-6E40-8519-8C23875DBEAC}" type="datetimeFigureOut">
               <a:rPr lang="en-US" smtClean="0"/>
-              <a:t>6/29/14</a:t>
+              <a:t>7/7/14</a:t>
             </a:fld>
             <a:endParaRPr lang="en-US"/>
           </a:p>
@@ -2507,7 +2508,7 @@
           <a:p>
             <a:fld id="{B9362D11-D6AC-6E40-8519-8C23875DBEAC}" type="datetimeFigureOut">
               <a:rPr lang="en-US" smtClean="0"/>
-              <a:t>6/29/14</a:t>
+              <a:t>7/7/14</a:t>
             </a:fld>
             <a:endParaRPr lang="en-US"/>
           </a:p>
@@ -2720,7 +2721,7 @@
           <a:p>
             <a:fld id="{B9362D11-D6AC-6E40-8519-8C23875DBEAC}" type="datetimeFigureOut">
               <a:rPr lang="en-US" smtClean="0"/>
-              <a:t>6/29/14</a:t>
+              <a:t>7/7/14</a:t>
             </a:fld>
             <a:endParaRPr lang="en-US"/>
           </a:p>
@@ -3315,6 +3316,817 @@
     <p:extLst>
       <p:ext uri="{BB962C8B-B14F-4D97-AF65-F5344CB8AC3E}">
         <p14:creationId xmlns:p14="http://schemas.microsoft.com/office/powerpoint/2010/main" val="452280057"/>
+      </p:ext>
+    </p:extLst>
+  </p:cSld>
+  <p:clrMapOvr>
+    <a:masterClrMapping/>
+  </p:clrMapOvr>
+</p:sld>
+</file>
+
+<file path=ppt/slides/slide2.xml><?xml version="1.0" encoding="utf-8"?>
+<p:sld xmlns:a="http://schemas.openxmlformats.org/drawingml/2006/main" xmlns:r="http://schemas.openxmlformats.org/officeDocument/2006/relationships" xmlns:p="http://schemas.openxmlformats.org/presentationml/2006/main">
+  <p:cSld>
+    <p:spTree>
+      <p:nvGrpSpPr>
+        <p:cNvPr id="1" name=""/>
+        <p:cNvGrpSpPr/>
+        <p:nvPr/>
+      </p:nvGrpSpPr>
+      <p:grpSpPr>
+        <a:xfrm>
+          <a:off x="0" y="0"/>
+          <a:ext cx="0" cy="0"/>
+          <a:chOff x="0" y="0"/>
+          <a:chExt cx="0" cy="0"/>
+        </a:xfrm>
+      </p:grpSpPr>
+      <p:sp>
+        <p:nvSpPr>
+          <p:cNvPr id="4" name="Can 3"/>
+          <p:cNvSpPr/>
+          <p:nvPr/>
+        </p:nvSpPr>
+        <p:spPr>
+          <a:xfrm>
+            <a:off x="320966" y="2147092"/>
+            <a:ext cx="2539805" cy="3938055"/>
+          </a:xfrm>
+          <a:prstGeom prst="can">
+            <a:avLst/>
+          </a:prstGeom>
+          <a:solidFill>
+            <a:schemeClr val="accent2"/>
+          </a:solidFill>
+          <a:ln>
+            <a:noFill/>
+          </a:ln>
+          <a:effectLst/>
+        </p:spPr>
+        <p:style>
+          <a:lnRef idx="1">
+            <a:schemeClr val="accent1"/>
+          </a:lnRef>
+          <a:fillRef idx="3">
+            <a:schemeClr val="accent1"/>
+          </a:fillRef>
+          <a:effectRef idx="2">
+            <a:schemeClr val="accent1"/>
+          </a:effectRef>
+          <a:fontRef idx="minor">
+            <a:schemeClr val="lt1"/>
+          </a:fontRef>
+        </p:style>
+        <p:txBody>
+          <a:bodyPr rtlCol="0" anchor="ctr"/>
+          <a:lstStyle/>
+          <a:p>
+            <a:pPr algn="ctr"/>
+            <a:r>
+              <a:rPr lang="en-US" sz="5400" dirty="0" err="1" smtClean="0"/>
+              <a:t>Redis</a:t>
+            </a:r>
+            <a:endParaRPr lang="en-US" sz="5400" dirty="0" smtClean="0"/>
+          </a:p>
+          <a:p>
+            <a:pPr algn="ctr"/>
+            <a:endParaRPr lang="en-US" sz="1900" dirty="0" smtClean="0"/>
+          </a:p>
+          <a:p>
+            <a:pPr algn="ctr"/>
+            <a:endParaRPr lang="en-US" sz="1900" dirty="0"/>
+          </a:p>
+          <a:p>
+            <a:pPr algn="ctr"/>
+            <a:r>
+              <a:rPr lang="en-US" sz="1900" dirty="0" smtClean="0"/>
+              <a:t>{Notification Object 1}</a:t>
+            </a:r>
+          </a:p>
+          <a:p>
+            <a:pPr algn="ctr"/>
+            <a:r>
+              <a:rPr lang="en-US" sz="1900" dirty="0"/>
+              <a:t>{Notification Object </a:t>
+            </a:r>
+            <a:r>
+              <a:rPr lang="en-US" sz="1900" dirty="0" smtClean="0"/>
+              <a:t>2}</a:t>
+            </a:r>
+            <a:endParaRPr lang="en-US" sz="1900" dirty="0"/>
+          </a:p>
+          <a:p>
+            <a:pPr algn="ctr"/>
+            <a:r>
+              <a:rPr lang="en-US" sz="1900" dirty="0"/>
+              <a:t>{Notification Object </a:t>
+            </a:r>
+            <a:r>
+              <a:rPr lang="en-US" sz="1900" dirty="0" smtClean="0"/>
+              <a:t>3}</a:t>
+            </a:r>
+          </a:p>
+          <a:p>
+            <a:pPr algn="ctr"/>
+            <a:r>
+              <a:rPr lang="en-US" sz="1900" dirty="0" smtClean="0"/>
+              <a:t>…</a:t>
+            </a:r>
+            <a:endParaRPr lang="en-US" sz="1900" dirty="0"/>
+          </a:p>
+        </p:txBody>
+      </p:sp>
+      <p:grpSp>
+        <p:nvGrpSpPr>
+          <p:cNvPr id="17" name="Group 16"/>
+          <p:cNvGrpSpPr/>
+          <p:nvPr/>
+        </p:nvGrpSpPr>
+        <p:grpSpPr>
+          <a:xfrm>
+            <a:off x="5184275" y="1779486"/>
+            <a:ext cx="3603874" cy="4340553"/>
+            <a:chOff x="5184275" y="1779486"/>
+            <a:chExt cx="3603874" cy="4340553"/>
+          </a:xfrm>
+        </p:grpSpPr>
+        <p:grpSp>
+          <p:nvGrpSpPr>
+            <p:cNvPr id="12" name="Group 11"/>
+            <p:cNvGrpSpPr/>
+            <p:nvPr/>
+          </p:nvGrpSpPr>
+          <p:grpSpPr>
+            <a:xfrm>
+              <a:off x="5184275" y="1779486"/>
+              <a:ext cx="2135112" cy="4340553"/>
+              <a:chOff x="6321606" y="1744594"/>
+              <a:chExt cx="2135112" cy="4340553"/>
+            </a:xfrm>
+          </p:grpSpPr>
+          <p:sp>
+            <p:nvSpPr>
+              <p:cNvPr id="5" name="Rounded Rectangle 4"/>
+              <p:cNvSpPr/>
+              <p:nvPr/>
+            </p:nvSpPr>
+            <p:spPr>
+              <a:xfrm>
+                <a:off x="6321606" y="1744594"/>
+                <a:ext cx="2135112" cy="837406"/>
+              </a:xfrm>
+              <a:prstGeom prst="roundRect">
+                <a:avLst/>
+              </a:prstGeom>
+              <a:solidFill>
+                <a:schemeClr val="accent1"/>
+              </a:solidFill>
+              <a:ln>
+                <a:noFill/>
+              </a:ln>
+              <a:effectLst/>
+            </p:spPr>
+            <p:style>
+              <a:lnRef idx="1">
+                <a:schemeClr val="accent1"/>
+              </a:lnRef>
+              <a:fillRef idx="3">
+                <a:schemeClr val="accent1"/>
+              </a:fillRef>
+              <a:effectRef idx="2">
+                <a:schemeClr val="accent1"/>
+              </a:effectRef>
+              <a:fontRef idx="minor">
+                <a:schemeClr val="lt1"/>
+              </a:fontRef>
+            </p:style>
+            <p:txBody>
+              <a:bodyPr rtlCol="0" anchor="ctr"/>
+              <a:lstStyle/>
+              <a:p>
+                <a:pPr algn="ctr"/>
+                <a:r>
+                  <a:rPr lang="en-US" sz="2400" dirty="0" smtClean="0"/>
+                  <a:t>Worker 1</a:t>
+                </a:r>
+                <a:endParaRPr lang="en-US" dirty="0"/>
+              </a:p>
+            </p:txBody>
+          </p:sp>
+          <p:sp>
+            <p:nvSpPr>
+              <p:cNvPr id="6" name="Rounded Rectangle 5"/>
+              <p:cNvSpPr/>
+              <p:nvPr/>
+            </p:nvSpPr>
+            <p:spPr>
+              <a:xfrm>
+                <a:off x="6321606" y="3112357"/>
+                <a:ext cx="2135112" cy="837406"/>
+              </a:xfrm>
+              <a:prstGeom prst="roundRect">
+                <a:avLst/>
+              </a:prstGeom>
+              <a:solidFill>
+                <a:schemeClr val="accent1"/>
+              </a:solidFill>
+              <a:ln>
+                <a:noFill/>
+              </a:ln>
+              <a:effectLst/>
+            </p:spPr>
+            <p:style>
+              <a:lnRef idx="1">
+                <a:schemeClr val="accent1"/>
+              </a:lnRef>
+              <a:fillRef idx="3">
+                <a:schemeClr val="accent1"/>
+              </a:fillRef>
+              <a:effectRef idx="2">
+                <a:schemeClr val="accent1"/>
+              </a:effectRef>
+              <a:fontRef idx="minor">
+                <a:schemeClr val="lt1"/>
+              </a:fontRef>
+            </p:style>
+            <p:txBody>
+              <a:bodyPr rtlCol="0" anchor="ctr"/>
+              <a:lstStyle/>
+              <a:p>
+                <a:pPr algn="ctr"/>
+                <a:r>
+                  <a:rPr lang="en-US" sz="2400" dirty="0" smtClean="0"/>
+                  <a:t>Worker 2</a:t>
+                </a:r>
+                <a:endParaRPr lang="en-US" dirty="0"/>
+              </a:p>
+            </p:txBody>
+          </p:sp>
+          <p:sp>
+            <p:nvSpPr>
+              <p:cNvPr id="7" name="Rounded Rectangle 6"/>
+              <p:cNvSpPr/>
+              <p:nvPr/>
+            </p:nvSpPr>
+            <p:spPr>
+              <a:xfrm>
+                <a:off x="6321606" y="5247741"/>
+                <a:ext cx="2135112" cy="837406"/>
+              </a:xfrm>
+              <a:prstGeom prst="roundRect">
+                <a:avLst/>
+              </a:prstGeom>
+              <a:solidFill>
+                <a:schemeClr val="accent1"/>
+              </a:solidFill>
+              <a:ln>
+                <a:noFill/>
+              </a:ln>
+              <a:effectLst/>
+            </p:spPr>
+            <p:style>
+              <a:lnRef idx="1">
+                <a:schemeClr val="accent1"/>
+              </a:lnRef>
+              <a:fillRef idx="3">
+                <a:schemeClr val="accent1"/>
+              </a:fillRef>
+              <a:effectRef idx="2">
+                <a:schemeClr val="accent1"/>
+              </a:effectRef>
+              <a:fontRef idx="minor">
+                <a:schemeClr val="lt1"/>
+              </a:fontRef>
+            </p:style>
+            <p:txBody>
+              <a:bodyPr rtlCol="0" anchor="ctr"/>
+              <a:lstStyle/>
+              <a:p>
+                <a:pPr algn="ctr"/>
+                <a:r>
+                  <a:rPr lang="en-US" sz="2400" dirty="0" smtClean="0"/>
+                  <a:t>Worker N</a:t>
+                </a:r>
+                <a:endParaRPr lang="en-US" dirty="0"/>
+              </a:p>
+            </p:txBody>
+          </p:sp>
+          <p:sp>
+            <p:nvSpPr>
+              <p:cNvPr id="8" name="Oval 7"/>
+              <p:cNvSpPr/>
+              <p:nvPr/>
+            </p:nvSpPr>
+            <p:spPr>
+              <a:xfrm>
+                <a:off x="7242634" y="4187025"/>
+                <a:ext cx="181415" cy="181438"/>
+              </a:xfrm>
+              <a:prstGeom prst="ellipse">
+                <a:avLst/>
+              </a:prstGeom>
+              <a:solidFill>
+                <a:schemeClr val="accent1"/>
+              </a:solidFill>
+              <a:ln>
+                <a:noFill/>
+              </a:ln>
+              <a:effectLst/>
+            </p:spPr>
+            <p:style>
+              <a:lnRef idx="1">
+                <a:schemeClr val="accent1"/>
+              </a:lnRef>
+              <a:fillRef idx="3">
+                <a:schemeClr val="accent1"/>
+              </a:fillRef>
+              <a:effectRef idx="2">
+                <a:schemeClr val="accent1"/>
+              </a:effectRef>
+              <a:fontRef idx="minor">
+                <a:schemeClr val="lt1"/>
+              </a:fontRef>
+            </p:style>
+            <p:txBody>
+              <a:bodyPr rtlCol="0" anchor="ctr"/>
+              <a:lstStyle/>
+              <a:p>
+                <a:pPr algn="ctr"/>
+                <a:endParaRPr lang="en-US"/>
+              </a:p>
+            </p:txBody>
+          </p:sp>
+          <p:sp>
+            <p:nvSpPr>
+              <p:cNvPr id="10" name="Oval 9"/>
+              <p:cNvSpPr/>
+              <p:nvPr/>
+            </p:nvSpPr>
+            <p:spPr>
+              <a:xfrm>
+                <a:off x="7242634" y="4513886"/>
+                <a:ext cx="181415" cy="181438"/>
+              </a:xfrm>
+              <a:prstGeom prst="ellipse">
+                <a:avLst/>
+              </a:prstGeom>
+              <a:solidFill>
+                <a:schemeClr val="accent1"/>
+              </a:solidFill>
+              <a:ln>
+                <a:noFill/>
+              </a:ln>
+              <a:effectLst/>
+            </p:spPr>
+            <p:style>
+              <a:lnRef idx="1">
+                <a:schemeClr val="accent1"/>
+              </a:lnRef>
+              <a:fillRef idx="3">
+                <a:schemeClr val="accent1"/>
+              </a:fillRef>
+              <a:effectRef idx="2">
+                <a:schemeClr val="accent1"/>
+              </a:effectRef>
+              <a:fontRef idx="minor">
+                <a:schemeClr val="lt1"/>
+              </a:fontRef>
+            </p:style>
+            <p:txBody>
+              <a:bodyPr rtlCol="0" anchor="ctr"/>
+              <a:lstStyle/>
+              <a:p>
+                <a:pPr algn="ctr"/>
+                <a:endParaRPr lang="en-US"/>
+              </a:p>
+            </p:txBody>
+          </p:sp>
+          <p:sp>
+            <p:nvSpPr>
+              <p:cNvPr id="11" name="Oval 10"/>
+              <p:cNvSpPr/>
+              <p:nvPr/>
+            </p:nvSpPr>
+            <p:spPr>
+              <a:xfrm>
+                <a:off x="7242634" y="4854702"/>
+                <a:ext cx="181415" cy="181438"/>
+              </a:xfrm>
+              <a:prstGeom prst="ellipse">
+                <a:avLst/>
+              </a:prstGeom>
+              <a:solidFill>
+                <a:schemeClr val="accent1"/>
+              </a:solidFill>
+              <a:ln>
+                <a:noFill/>
+              </a:ln>
+              <a:effectLst/>
+            </p:spPr>
+            <p:style>
+              <a:lnRef idx="1">
+                <a:schemeClr val="accent1"/>
+              </a:lnRef>
+              <a:fillRef idx="3">
+                <a:schemeClr val="accent1"/>
+              </a:fillRef>
+              <a:effectRef idx="2">
+                <a:schemeClr val="accent1"/>
+              </a:effectRef>
+              <a:fontRef idx="minor">
+                <a:schemeClr val="lt1"/>
+              </a:fontRef>
+            </p:style>
+            <p:txBody>
+              <a:bodyPr rtlCol="0" anchor="ctr"/>
+              <a:lstStyle/>
+              <a:p>
+                <a:pPr algn="ctr"/>
+                <a:endParaRPr lang="en-US"/>
+              </a:p>
+            </p:txBody>
+          </p:sp>
+        </p:grpSp>
+        <p:sp>
+          <p:nvSpPr>
+            <p:cNvPr id="14" name="Right Arrow 13"/>
+            <p:cNvSpPr/>
+            <p:nvPr/>
+          </p:nvSpPr>
+          <p:spPr>
+            <a:xfrm>
+              <a:off x="7305432" y="1835314"/>
+              <a:ext cx="1482717" cy="728737"/>
+            </a:xfrm>
+            <a:prstGeom prst="rightArrow">
+              <a:avLst/>
+            </a:prstGeom>
+            <a:solidFill>
+              <a:schemeClr val="accent1"/>
+            </a:solidFill>
+            <a:ln>
+              <a:noFill/>
+            </a:ln>
+            <a:effectLst/>
+          </p:spPr>
+          <p:style>
+            <a:lnRef idx="1">
+              <a:schemeClr val="accent1"/>
+            </a:lnRef>
+            <a:fillRef idx="3">
+              <a:schemeClr val="accent1"/>
+            </a:fillRef>
+            <a:effectRef idx="2">
+              <a:schemeClr val="accent1"/>
+            </a:effectRef>
+            <a:fontRef idx="minor">
+              <a:schemeClr val="lt1"/>
+            </a:fontRef>
+          </p:style>
+          <p:txBody>
+            <a:bodyPr rtlCol="0" anchor="ctr"/>
+            <a:lstStyle/>
+            <a:p>
+              <a:pPr algn="ctr"/>
+              <a:r>
+                <a:rPr lang="en-US" sz="2200" dirty="0" smtClean="0"/>
+                <a:t>Notify</a:t>
+              </a:r>
+              <a:endParaRPr lang="en-US" sz="2200" dirty="0"/>
+            </a:p>
+          </p:txBody>
+        </p:sp>
+        <p:sp>
+          <p:nvSpPr>
+            <p:cNvPr id="15" name="Right Arrow 14"/>
+            <p:cNvSpPr/>
+            <p:nvPr/>
+          </p:nvSpPr>
+          <p:spPr>
+            <a:xfrm>
+              <a:off x="7305432" y="3214047"/>
+              <a:ext cx="1482717" cy="728737"/>
+            </a:xfrm>
+            <a:prstGeom prst="rightArrow">
+              <a:avLst/>
+            </a:prstGeom>
+            <a:solidFill>
+              <a:schemeClr val="accent1"/>
+            </a:solidFill>
+            <a:ln>
+              <a:noFill/>
+            </a:ln>
+            <a:effectLst/>
+          </p:spPr>
+          <p:style>
+            <a:lnRef idx="1">
+              <a:schemeClr val="accent1"/>
+            </a:lnRef>
+            <a:fillRef idx="3">
+              <a:schemeClr val="accent1"/>
+            </a:fillRef>
+            <a:effectRef idx="2">
+              <a:schemeClr val="accent1"/>
+            </a:effectRef>
+            <a:fontRef idx="minor">
+              <a:schemeClr val="lt1"/>
+            </a:fontRef>
+          </p:style>
+          <p:txBody>
+            <a:bodyPr rtlCol="0" anchor="ctr"/>
+            <a:lstStyle/>
+            <a:p>
+              <a:pPr algn="ctr"/>
+              <a:r>
+                <a:rPr lang="en-US" sz="2200" dirty="0" smtClean="0"/>
+                <a:t>Notify</a:t>
+              </a:r>
+              <a:endParaRPr lang="en-US" sz="2200" dirty="0"/>
+            </a:p>
+          </p:txBody>
+        </p:sp>
+        <p:sp>
+          <p:nvSpPr>
+            <p:cNvPr id="16" name="Right Arrow 15"/>
+            <p:cNvSpPr/>
+            <p:nvPr/>
+          </p:nvSpPr>
+          <p:spPr>
+            <a:xfrm>
+              <a:off x="7305432" y="5338461"/>
+              <a:ext cx="1482717" cy="728737"/>
+            </a:xfrm>
+            <a:prstGeom prst="rightArrow">
+              <a:avLst/>
+            </a:prstGeom>
+            <a:solidFill>
+              <a:schemeClr val="accent1"/>
+            </a:solidFill>
+            <a:ln>
+              <a:noFill/>
+            </a:ln>
+            <a:effectLst/>
+          </p:spPr>
+          <p:style>
+            <a:lnRef idx="1">
+              <a:schemeClr val="accent1"/>
+            </a:lnRef>
+            <a:fillRef idx="3">
+              <a:schemeClr val="accent1"/>
+            </a:fillRef>
+            <a:effectRef idx="2">
+              <a:schemeClr val="accent1"/>
+            </a:effectRef>
+            <a:fontRef idx="minor">
+              <a:schemeClr val="lt1"/>
+            </a:fontRef>
+          </p:style>
+          <p:txBody>
+            <a:bodyPr rtlCol="0" anchor="ctr"/>
+            <a:lstStyle/>
+            <a:p>
+              <a:pPr algn="ctr"/>
+              <a:r>
+                <a:rPr lang="en-US" sz="2200" dirty="0" smtClean="0"/>
+                <a:t>Notify</a:t>
+              </a:r>
+              <a:endParaRPr lang="en-US" sz="2200" dirty="0"/>
+            </a:p>
+          </p:txBody>
+        </p:sp>
+      </p:grpSp>
+      <p:cxnSp>
+        <p:nvCxnSpPr>
+          <p:cNvPr id="19" name="Straight Arrow Connector 18"/>
+          <p:cNvCxnSpPr>
+            <a:endCxn id="4" idx="1"/>
+          </p:cNvCxnSpPr>
+          <p:nvPr/>
+        </p:nvCxnSpPr>
+        <p:spPr>
+          <a:xfrm>
+            <a:off x="1590869" y="823448"/>
+            <a:ext cx="0" cy="1323644"/>
+          </a:xfrm>
+          <a:prstGeom prst="straightConnector1">
+            <a:avLst/>
+          </a:prstGeom>
+          <a:ln w="127000">
+            <a:solidFill>
+              <a:schemeClr val="accent1">
+                <a:lumMod val="75000"/>
+              </a:schemeClr>
+            </a:solidFill>
+            <a:tailEnd type="triangle" w="lg" len="med"/>
+          </a:ln>
+          <a:effectLst/>
+        </p:spPr>
+        <p:style>
+          <a:lnRef idx="2">
+            <a:schemeClr val="accent1"/>
+          </a:lnRef>
+          <a:fillRef idx="0">
+            <a:schemeClr val="accent1"/>
+          </a:fillRef>
+          <a:effectRef idx="1">
+            <a:schemeClr val="accent1"/>
+          </a:effectRef>
+          <a:fontRef idx="minor">
+            <a:schemeClr val="tx1"/>
+          </a:fontRef>
+        </p:style>
+      </p:cxnSp>
+      <p:sp>
+        <p:nvSpPr>
+          <p:cNvPr id="20" name="TextBox 19"/>
+          <p:cNvSpPr txBox="1"/>
+          <p:nvPr/>
+        </p:nvSpPr>
+        <p:spPr>
+          <a:xfrm>
+            <a:off x="281436" y="292703"/>
+            <a:ext cx="2807079" cy="461665"/>
+          </a:xfrm>
+          <a:prstGeom prst="rect">
+            <a:avLst/>
+          </a:prstGeom>
+          <a:noFill/>
+        </p:spPr>
+        <p:txBody>
+          <a:bodyPr wrap="none" rtlCol="0">
+            <a:spAutoFit/>
+          </a:bodyPr>
+          <a:lstStyle/>
+          <a:p>
+            <a:r>
+              <a:rPr lang="en-US" sz="2400" dirty="0" smtClean="0"/>
+              <a:t>Dispatch Notification</a:t>
+            </a:r>
+            <a:endParaRPr lang="en-US" sz="2400" dirty="0"/>
+          </a:p>
+        </p:txBody>
+      </p:sp>
+      <p:cxnSp>
+        <p:nvCxnSpPr>
+          <p:cNvPr id="23" name="Straight Arrow Connector 22"/>
+          <p:cNvCxnSpPr>
+            <a:endCxn id="5" idx="1"/>
+          </p:cNvCxnSpPr>
+          <p:nvPr/>
+        </p:nvCxnSpPr>
+        <p:spPr>
+          <a:xfrm flipV="1">
+            <a:off x="2860771" y="2198189"/>
+            <a:ext cx="2323504" cy="1786466"/>
+          </a:xfrm>
+          <a:prstGeom prst="straightConnector1">
+            <a:avLst/>
+          </a:prstGeom>
+          <a:ln w="38100">
+            <a:solidFill>
+              <a:schemeClr val="accent1">
+                <a:lumMod val="75000"/>
+              </a:schemeClr>
+            </a:solidFill>
+            <a:headEnd type="triangle" w="lg" len="med"/>
+            <a:tailEnd type="triangle" w="lg" len="med"/>
+          </a:ln>
+          <a:effectLst/>
+        </p:spPr>
+        <p:style>
+          <a:lnRef idx="2">
+            <a:schemeClr val="accent1"/>
+          </a:lnRef>
+          <a:fillRef idx="0">
+            <a:schemeClr val="accent1"/>
+          </a:fillRef>
+          <a:effectRef idx="1">
+            <a:schemeClr val="accent1"/>
+          </a:effectRef>
+          <a:fontRef idx="minor">
+            <a:schemeClr val="tx1"/>
+          </a:fontRef>
+        </p:style>
+      </p:cxnSp>
+      <p:cxnSp>
+        <p:nvCxnSpPr>
+          <p:cNvPr id="26" name="Straight Arrow Connector 25"/>
+          <p:cNvCxnSpPr>
+            <a:endCxn id="6" idx="1"/>
+          </p:cNvCxnSpPr>
+          <p:nvPr/>
+        </p:nvCxnSpPr>
+        <p:spPr>
+          <a:xfrm flipV="1">
+            <a:off x="2860771" y="3565952"/>
+            <a:ext cx="2323504" cy="655965"/>
+          </a:xfrm>
+          <a:prstGeom prst="straightConnector1">
+            <a:avLst/>
+          </a:prstGeom>
+          <a:ln w="38100">
+            <a:solidFill>
+              <a:schemeClr val="accent1">
+                <a:lumMod val="75000"/>
+              </a:schemeClr>
+            </a:solidFill>
+            <a:headEnd type="triangle" w="lg" len="med"/>
+            <a:tailEnd type="triangle" w="lg" len="med"/>
+          </a:ln>
+          <a:effectLst/>
+        </p:spPr>
+        <p:style>
+          <a:lnRef idx="2">
+            <a:schemeClr val="accent1"/>
+          </a:lnRef>
+          <a:fillRef idx="0">
+            <a:schemeClr val="accent1"/>
+          </a:fillRef>
+          <a:effectRef idx="1">
+            <a:schemeClr val="accent1"/>
+          </a:effectRef>
+          <a:fontRef idx="minor">
+            <a:schemeClr val="tx1"/>
+          </a:fontRef>
+        </p:style>
+      </p:cxnSp>
+      <p:cxnSp>
+        <p:nvCxnSpPr>
+          <p:cNvPr id="29" name="Straight Arrow Connector 28"/>
+          <p:cNvCxnSpPr>
+            <a:endCxn id="7" idx="1"/>
+          </p:cNvCxnSpPr>
+          <p:nvPr/>
+        </p:nvCxnSpPr>
+        <p:spPr>
+          <a:xfrm>
+            <a:off x="2860771" y="4403355"/>
+            <a:ext cx="2323504" cy="1297981"/>
+          </a:xfrm>
+          <a:prstGeom prst="straightConnector1">
+            <a:avLst/>
+          </a:prstGeom>
+          <a:ln w="38100">
+            <a:solidFill>
+              <a:schemeClr val="accent1">
+                <a:lumMod val="75000"/>
+              </a:schemeClr>
+            </a:solidFill>
+            <a:headEnd type="triangle" w="lg" len="med"/>
+            <a:tailEnd type="triangle" w="lg" len="med"/>
+          </a:ln>
+          <a:effectLst/>
+        </p:spPr>
+        <p:style>
+          <a:lnRef idx="2">
+            <a:schemeClr val="accent1"/>
+          </a:lnRef>
+          <a:fillRef idx="0">
+            <a:schemeClr val="accent1"/>
+          </a:fillRef>
+          <a:effectRef idx="1">
+            <a:schemeClr val="accent1"/>
+          </a:effectRef>
+          <a:fontRef idx="minor">
+            <a:schemeClr val="tx1"/>
+          </a:fontRef>
+        </p:style>
+      </p:cxnSp>
+      <p:sp>
+        <p:nvSpPr>
+          <p:cNvPr id="32" name="TextBox 31"/>
+          <p:cNvSpPr txBox="1"/>
+          <p:nvPr/>
+        </p:nvSpPr>
+        <p:spPr>
+          <a:xfrm>
+            <a:off x="3660774" y="3943303"/>
+            <a:ext cx="1321153" cy="461665"/>
+          </a:xfrm>
+          <a:prstGeom prst="rect">
+            <a:avLst/>
+          </a:prstGeom>
+          <a:noFill/>
+        </p:spPr>
+        <p:txBody>
+          <a:bodyPr wrap="square" rtlCol="0">
+            <a:spAutoFit/>
+          </a:bodyPr>
+          <a:lstStyle/>
+          <a:p>
+            <a:r>
+              <a:rPr lang="en-US" sz="2400" dirty="0" smtClean="0"/>
+              <a:t>Pub/Sub</a:t>
+            </a:r>
+            <a:endParaRPr lang="en-US" sz="2400" dirty="0"/>
+          </a:p>
+        </p:txBody>
+      </p:sp>
+    </p:spTree>
+    <p:extLst>
+      <p:ext uri="{BB962C8B-B14F-4D97-AF65-F5344CB8AC3E}">
+        <p14:creationId xmlns:p14="http://schemas.microsoft.com/office/powerpoint/2010/main" val="609903484"/>
       </p:ext>
     </p:extLst>
   </p:cSld>

</xml_diff>